<commit_message>
Complete Roma and Ilshat Diplom
</commit_message>
<xml_diff>
--- a/2023/Диплом/Ильшат Хабибрахманов/Презентация Ильшат.pptx
+++ b/2023/Диплом/Ильшат Хабибрахманов/Презентация Ильшат.pptx
@@ -10,11 +10,8 @@
     <p:sldId id="258" r:id="rId4"/>
     <p:sldId id="259" r:id="rId5"/>
     <p:sldId id="260" r:id="rId6"/>
-    <p:sldId id="262" r:id="rId7"/>
-    <p:sldId id="263" r:id="rId8"/>
-    <p:sldId id="264" r:id="rId9"/>
-    <p:sldId id="265" r:id="rId10"/>
-    <p:sldId id="266" r:id="rId11"/>
+    <p:sldId id="263" r:id="rId7"/>
+    <p:sldId id="266" r:id="rId8"/>
   </p:sldIdLst>
   <p:sldSz cx="12192000" cy="6858000"/>
   <p:notesSz cx="6858000" cy="9144000"/>
@@ -309,7 +306,7 @@
           <a:p>
             <a:fld id="{8720104C-3C9D-4B62-9936-5C987D21D7C9}" type="datetimeFigureOut">
               <a:rPr lang="ru-RU" smtClean="0"/>
-              <a:t>23.04.2023</a:t>
+              <a:t>14.05.2023</a:t>
             </a:fld>
             <a:endParaRPr lang="ru-RU"/>
           </a:p>
@@ -647,7 +644,7 @@
           <a:p>
             <a:fld id="{8720104C-3C9D-4B62-9936-5C987D21D7C9}" type="datetimeFigureOut">
               <a:rPr lang="ru-RU" smtClean="0"/>
-              <a:t>23.04.2023</a:t>
+              <a:t>14.05.2023</a:t>
             </a:fld>
             <a:endParaRPr lang="ru-RU"/>
           </a:p>
@@ -1048,7 +1045,7 @@
           <a:p>
             <a:fld id="{8720104C-3C9D-4B62-9936-5C987D21D7C9}" type="datetimeFigureOut">
               <a:rPr lang="ru-RU" smtClean="0"/>
-              <a:t>23.04.2023</a:t>
+              <a:t>14.05.2023</a:t>
             </a:fld>
             <a:endParaRPr lang="ru-RU"/>
           </a:p>
@@ -1384,7 +1381,7 @@
           <a:p>
             <a:fld id="{8720104C-3C9D-4B62-9936-5C987D21D7C9}" type="datetimeFigureOut">
               <a:rPr lang="ru-RU" smtClean="0"/>
-              <a:t>23.04.2023</a:t>
+              <a:t>14.05.2023</a:t>
             </a:fld>
             <a:endParaRPr lang="ru-RU"/>
           </a:p>
@@ -1704,7 +1701,7 @@
           <a:p>
             <a:fld id="{8720104C-3C9D-4B62-9936-5C987D21D7C9}" type="datetimeFigureOut">
               <a:rPr lang="ru-RU" smtClean="0"/>
-              <a:t>23.04.2023</a:t>
+              <a:t>14.05.2023</a:t>
             </a:fld>
             <a:endParaRPr lang="ru-RU"/>
           </a:p>
@@ -2100,7 +2097,7 @@
           <a:p>
             <a:fld id="{8720104C-3C9D-4B62-9936-5C987D21D7C9}" type="datetimeFigureOut">
               <a:rPr lang="ru-RU" smtClean="0"/>
-              <a:t>23.04.2023</a:t>
+              <a:t>14.05.2023</a:t>
             </a:fld>
             <a:endParaRPr lang="ru-RU"/>
           </a:p>
@@ -2357,7 +2354,7 @@
           <a:p>
             <a:fld id="{8720104C-3C9D-4B62-9936-5C987D21D7C9}" type="datetimeFigureOut">
               <a:rPr lang="ru-RU" smtClean="0"/>
-              <a:t>23.04.2023</a:t>
+              <a:t>14.05.2023</a:t>
             </a:fld>
             <a:endParaRPr lang="ru-RU"/>
           </a:p>
@@ -2619,7 +2616,7 @@
           <a:p>
             <a:fld id="{8720104C-3C9D-4B62-9936-5C987D21D7C9}" type="datetimeFigureOut">
               <a:rPr lang="ru-RU" smtClean="0"/>
-              <a:t>23.04.2023</a:t>
+              <a:t>14.05.2023</a:t>
             </a:fld>
             <a:endParaRPr lang="ru-RU"/>
           </a:p>
@@ -2881,7 +2878,7 @@
           <a:p>
             <a:fld id="{8720104C-3C9D-4B62-9936-5C987D21D7C9}" type="datetimeFigureOut">
               <a:rPr lang="ru-RU" smtClean="0"/>
-              <a:t>23.04.2023</a:t>
+              <a:t>14.05.2023</a:t>
             </a:fld>
             <a:endParaRPr lang="ru-RU"/>
           </a:p>
@@ -3210,7 +3207,7 @@
           <a:p>
             <a:fld id="{8720104C-3C9D-4B62-9936-5C987D21D7C9}" type="datetimeFigureOut">
               <a:rPr lang="ru-RU" smtClean="0"/>
-              <a:t>23.04.2023</a:t>
+              <a:t>14.05.2023</a:t>
             </a:fld>
             <a:endParaRPr lang="ru-RU"/>
           </a:p>
@@ -3533,7 +3530,7 @@
           <a:p>
             <a:fld id="{8720104C-3C9D-4B62-9936-5C987D21D7C9}" type="datetimeFigureOut">
               <a:rPr lang="ru-RU" smtClean="0"/>
-              <a:t>23.04.2023</a:t>
+              <a:t>14.05.2023</a:t>
             </a:fld>
             <a:endParaRPr lang="ru-RU"/>
           </a:p>
@@ -3990,7 +3987,7 @@
           <a:p>
             <a:fld id="{8720104C-3C9D-4B62-9936-5C987D21D7C9}" type="datetimeFigureOut">
               <a:rPr lang="ru-RU" smtClean="0"/>
-              <a:t>23.04.2023</a:t>
+              <a:t>14.05.2023</a:t>
             </a:fld>
             <a:endParaRPr lang="ru-RU"/>
           </a:p>
@@ -4195,7 +4192,7 @@
           <a:p>
             <a:fld id="{8720104C-3C9D-4B62-9936-5C987D21D7C9}" type="datetimeFigureOut">
               <a:rPr lang="ru-RU" smtClean="0"/>
-              <a:t>23.04.2023</a:t>
+              <a:t>14.05.2023</a:t>
             </a:fld>
             <a:endParaRPr lang="ru-RU"/>
           </a:p>
@@ -4372,7 +4369,7 @@
           <a:p>
             <a:fld id="{8720104C-3C9D-4B62-9936-5C987D21D7C9}" type="datetimeFigureOut">
               <a:rPr lang="ru-RU" smtClean="0"/>
-              <a:t>23.04.2023</a:t>
+              <a:t>14.05.2023</a:t>
             </a:fld>
             <a:endParaRPr lang="ru-RU"/>
           </a:p>
@@ -4705,7 +4702,7 @@
           <a:p>
             <a:fld id="{8720104C-3C9D-4B62-9936-5C987D21D7C9}" type="datetimeFigureOut">
               <a:rPr lang="ru-RU" smtClean="0"/>
-              <a:t>23.04.2023</a:t>
+              <a:t>14.05.2023</a:t>
             </a:fld>
             <a:endParaRPr lang="ru-RU"/>
           </a:p>
@@ -5050,7 +5047,7 @@
           <a:p>
             <a:fld id="{8720104C-3C9D-4B62-9936-5C987D21D7C9}" type="datetimeFigureOut">
               <a:rPr lang="ru-RU" smtClean="0"/>
-              <a:t>23.04.2023</a:t>
+              <a:t>14.05.2023</a:t>
             </a:fld>
             <a:endParaRPr lang="ru-RU"/>
           </a:p>
@@ -7167,7 +7164,7 @@
           <a:p>
             <a:fld id="{8720104C-3C9D-4B62-9936-5C987D21D7C9}" type="datetimeFigureOut">
               <a:rPr lang="ru-RU" smtClean="0"/>
-              <a:t>23.04.2023</a:t>
+              <a:t>14.05.2023</a:t>
             </a:fld>
             <a:endParaRPr lang="ru-RU"/>
           </a:p>
@@ -7864,78 +7861,6 @@
 </p:sld>
 </file>
 
-<file path=ppt/slides/slide10.xml><?xml version="1.0" encoding="utf-8"?>
-<p:sld xmlns:a="http://schemas.openxmlformats.org/drawingml/2006/main" xmlns:r="http://schemas.openxmlformats.org/officeDocument/2006/relationships" xmlns:p="http://schemas.openxmlformats.org/presentationml/2006/main">
-  <p:cSld>
-    <p:spTree>
-      <p:nvGrpSpPr>
-        <p:cNvPr id="1" name=""/>
-        <p:cNvGrpSpPr/>
-        <p:nvPr/>
-      </p:nvGrpSpPr>
-      <p:grpSpPr>
-        <a:xfrm>
-          <a:off x="0" y="0"/>
-          <a:ext cx="0" cy="0"/>
-          <a:chOff x="0" y="0"/>
-          <a:chExt cx="0" cy="0"/>
-        </a:xfrm>
-      </p:grpSpPr>
-      <p:sp>
-        <p:nvSpPr>
-          <p:cNvPr id="2" name="Заголовок 1"/>
-          <p:cNvSpPr>
-            <a:spLocks noGrp="1"/>
-          </p:cNvSpPr>
-          <p:nvPr>
-            <p:ph type="title"/>
-          </p:nvPr>
-        </p:nvSpPr>
-        <p:spPr>
-          <a:xfrm>
-            <a:off x="1633298" y="2632364"/>
-            <a:ext cx="8596668" cy="1320800"/>
-          </a:xfrm>
-        </p:spPr>
-        <p:txBody>
-          <a:bodyPr>
-            <a:normAutofit/>
-          </a:bodyPr>
-          <a:lstStyle/>
-          <a:p>
-            <a:r>
-              <a:rPr lang="ru-RU" sz="6000" dirty="0" smtClean="0">
-                <a:solidFill>
-                  <a:schemeClr val="tx1"/>
-                </a:solidFill>
-                <a:latin typeface="Times New Roman" panose="02020603050405020304" pitchFamily="18" charset="0"/>
-                <a:cs typeface="Times New Roman" panose="02020603050405020304" pitchFamily="18" charset="0"/>
-              </a:rPr>
-              <a:t>Спасибо за просмотр!</a:t>
-            </a:r>
-            <a:endParaRPr lang="ru-RU" sz="6000" dirty="0">
-              <a:solidFill>
-                <a:schemeClr val="tx1"/>
-              </a:solidFill>
-              <a:latin typeface="Times New Roman" panose="02020603050405020304" pitchFamily="18" charset="0"/>
-              <a:cs typeface="Times New Roman" panose="02020603050405020304" pitchFamily="18" charset="0"/>
-            </a:endParaRPr>
-          </a:p>
-        </p:txBody>
-      </p:sp>
-    </p:spTree>
-    <p:extLst>
-      <p:ext uri="{BB962C8B-B14F-4D97-AF65-F5344CB8AC3E}">
-        <p14:creationId xmlns:p14="http://schemas.microsoft.com/office/powerpoint/2010/main" val="3035190050"/>
-      </p:ext>
-    </p:extLst>
-  </p:cSld>
-  <p:clrMapOvr>
-    <a:masterClrMapping/>
-  </p:clrMapOvr>
-</p:sld>
-</file>
-
 <file path=ppt/slides/slide2.xml><?xml version="1.0" encoding="utf-8"?>
 <p:sld xmlns:a="http://schemas.openxmlformats.org/drawingml/2006/main" xmlns:r="http://schemas.openxmlformats.org/officeDocument/2006/relationships" xmlns:p="http://schemas.openxmlformats.org/presentationml/2006/main">
   <p:cSld>
@@ -8071,22 +7996,6 @@
                 <a:cs typeface="Times New Roman" panose="02020603050405020304" pitchFamily="18" charset="0"/>
               </a:rPr>
               <a:t>АНАЛИЗ УСТОЙЧИВОСТИ СИСТЕМЫ АВТОМАТИЧЕСКОГО РЕГУЛИРОВАНИЯ</a:t>
-            </a:r>
-          </a:p>
-          <a:p>
-            <a:pPr marL="285750" indent="-285750">
-              <a:buFont typeface="Arial" panose="020B0604020202020204" pitchFamily="34" charset="0"/>
-              <a:buChar char="•"/>
-            </a:pPr>
-            <a:r>
-              <a:rPr lang="ru-RU" sz="2800" dirty="0" smtClean="0">
-                <a:solidFill>
-                  <a:schemeClr val="tx1"/>
-                </a:solidFill>
-                <a:latin typeface="Times New Roman" panose="02020603050405020304" pitchFamily="18" charset="0"/>
-                <a:cs typeface="Times New Roman" panose="02020603050405020304" pitchFamily="18" charset="0"/>
-              </a:rPr>
-              <a:t>РАСЧЕТ НАСТРОЕК РЕГУЛЯТОР</a:t>
             </a:r>
           </a:p>
           <a:p>
@@ -8467,109 +8376,6 @@
 </file>
 
 <file path=ppt/slides/slide6.xml><?xml version="1.0" encoding="utf-8"?>
-<p:sld xmlns:a="http://schemas.openxmlformats.org/drawingml/2006/main" xmlns:r="http://schemas.openxmlformats.org/officeDocument/2006/relationships" xmlns:p="http://schemas.openxmlformats.org/presentationml/2006/main">
-  <p:cSld>
-    <p:spTree>
-      <p:nvGrpSpPr>
-        <p:cNvPr id="1" name=""/>
-        <p:cNvGrpSpPr/>
-        <p:nvPr/>
-      </p:nvGrpSpPr>
-      <p:grpSpPr>
-        <a:xfrm>
-          <a:off x="0" y="0"/>
-          <a:ext cx="0" cy="0"/>
-          <a:chOff x="0" y="0"/>
-          <a:chExt cx="0" cy="0"/>
-        </a:xfrm>
-      </p:grpSpPr>
-      <p:sp>
-        <p:nvSpPr>
-          <p:cNvPr id="2" name="Заголовок 1"/>
-          <p:cNvSpPr>
-            <a:spLocks noGrp="1"/>
-          </p:cNvSpPr>
-          <p:nvPr>
-            <p:ph type="title"/>
-          </p:nvPr>
-        </p:nvSpPr>
-        <p:spPr/>
-        <p:txBody>
-          <a:bodyPr/>
-          <a:lstStyle/>
-          <a:p>
-            <a:r>
-              <a:rPr lang="ru-RU" dirty="0">
-                <a:solidFill>
-                  <a:schemeClr val="tx1"/>
-                </a:solidFill>
-                <a:latin typeface="Times New Roman" panose="02020603050405020304" pitchFamily="18" charset="0"/>
-                <a:cs typeface="Times New Roman" panose="02020603050405020304" pitchFamily="18" charset="0"/>
-              </a:rPr>
-              <a:t>РАСЧЕТ НАСТРОЕК </a:t>
-            </a:r>
-            <a:r>
-              <a:rPr lang="ru-RU" dirty="0" smtClean="0">
-                <a:solidFill>
-                  <a:schemeClr val="tx1"/>
-                </a:solidFill>
-                <a:latin typeface="Times New Roman" panose="02020603050405020304" pitchFamily="18" charset="0"/>
-                <a:cs typeface="Times New Roman" panose="02020603050405020304" pitchFamily="18" charset="0"/>
-              </a:rPr>
-              <a:t>РЕГУЛЯТОР</a:t>
-            </a:r>
-            <a:endParaRPr lang="ru-RU" dirty="0"/>
-          </a:p>
-        </p:txBody>
-      </p:sp>
-      <p:pic>
-        <p:nvPicPr>
-          <p:cNvPr id="4" name="Объект 3"/>
-          <p:cNvPicPr>
-            <a:picLocks noGrp="1"/>
-          </p:cNvPicPr>
-          <p:nvPr>
-            <p:ph idx="1"/>
-          </p:nvPr>
-        </p:nvPicPr>
-        <p:blipFill>
-          <a:blip r:embed="rId2"/>
-          <a:srcRect/>
-          <a:stretch>
-            <a:fillRect/>
-          </a:stretch>
-        </p:blipFill>
-        <p:spPr bwMode="auto">
-          <a:xfrm>
-            <a:off x="1148389" y="1500807"/>
-            <a:ext cx="9935248" cy="4622901"/>
-          </a:xfrm>
-          <a:prstGeom prst="rect">
-            <a:avLst/>
-          </a:prstGeom>
-          <a:noFill/>
-          <a:ln w="9525">
-            <a:noFill/>
-            <a:miter lim="800000"/>
-            <a:headEnd/>
-            <a:tailEnd/>
-          </a:ln>
-        </p:spPr>
-      </p:pic>
-    </p:spTree>
-    <p:extLst>
-      <p:ext uri="{BB962C8B-B14F-4D97-AF65-F5344CB8AC3E}">
-        <p14:creationId xmlns:p14="http://schemas.microsoft.com/office/powerpoint/2010/main" val="846680110"/>
-      </p:ext>
-    </p:extLst>
-  </p:cSld>
-  <p:clrMapOvr>
-    <a:masterClrMapping/>
-  </p:clrMapOvr>
-</p:sld>
-</file>
-
-<file path=ppt/slides/slide7.xml><?xml version="1.0" encoding="utf-8"?>
 <p:sld xmlns:a="http://schemas.openxmlformats.org/drawingml/2006/main" xmlns:r="http://schemas.openxmlformats.org/officeDocument/2006/relationships" xmlns:p="http://schemas.openxmlformats.org/presentationml/2006/main">
   <p:cSld>
     <p:spTree>
@@ -8715,7 +8521,7 @@
 </p:sld>
 </file>
 
-<file path=ppt/slides/slide8.xml><?xml version="1.0" encoding="utf-8"?>
+<file path=ppt/slides/slide7.xml><?xml version="1.0" encoding="utf-8"?>
 <p:sld xmlns:a="http://schemas.openxmlformats.org/drawingml/2006/main" xmlns:r="http://schemas.openxmlformats.org/officeDocument/2006/relationships" xmlns:p="http://schemas.openxmlformats.org/presentationml/2006/main">
   <p:cSld>
     <p:spTree>
@@ -8744,8 +8550,8 @@
         </p:nvSpPr>
         <p:spPr>
           <a:xfrm>
-            <a:off x="0" y="124691"/>
-            <a:ext cx="12192000" cy="845127"/>
+            <a:off x="1633298" y="2632364"/>
+            <a:ext cx="8596668" cy="1320800"/>
           </a:xfrm>
         </p:spPr>
         <p:txBody>
@@ -8755,132 +8561,16 @@
           <a:lstStyle/>
           <a:p>
             <a:r>
-              <a:rPr lang="ru-RU" dirty="0">
+              <a:rPr lang="ru-RU" sz="6000" dirty="0" smtClean="0">
                 <a:solidFill>
                   <a:schemeClr val="tx1"/>
                 </a:solidFill>
                 <a:latin typeface="Times New Roman" panose="02020603050405020304" pitchFamily="18" charset="0"/>
                 <a:cs typeface="Times New Roman" panose="02020603050405020304" pitchFamily="18" charset="0"/>
               </a:rPr>
-              <a:t>БЕЗОПАСНОСТЬ И ЭКОЛОГИЧНОСТЬ </a:t>
-            </a:r>
-            <a:r>
-              <a:rPr lang="ru-RU" dirty="0" smtClean="0">
-                <a:solidFill>
-                  <a:schemeClr val="tx1"/>
-                </a:solidFill>
-                <a:latin typeface="Times New Roman" panose="02020603050405020304" pitchFamily="18" charset="0"/>
-                <a:cs typeface="Times New Roman" panose="02020603050405020304" pitchFamily="18" charset="0"/>
-              </a:rPr>
-              <a:t>ТЕХ.ПРОЦЕССА</a:t>
-            </a:r>
-            <a:endParaRPr lang="ru-RU" dirty="0"/>
-          </a:p>
-        </p:txBody>
-      </p:sp>
-      <p:pic>
-        <p:nvPicPr>
-          <p:cNvPr id="2050" name="Picture 2" descr="Экология и природопользование, направленность «Экология» - Официальный сайт  НИМИ ДГАУ"/>
-          <p:cNvPicPr>
-            <a:picLocks noChangeAspect="1" noChangeArrowheads="1"/>
-          </p:cNvPicPr>
-          <p:nvPr/>
-        </p:nvPicPr>
-        <p:blipFill>
-          <a:blip r:embed="rId2">
-            <a:extLst>
-              <a:ext uri="{28A0092B-C50C-407E-A947-70E740481C1C}">
-                <a14:useLocalDpi xmlns:a14="http://schemas.microsoft.com/office/drawing/2010/main" val="0"/>
-              </a:ext>
-            </a:extLst>
-          </a:blip>
-          <a:srcRect/>
-          <a:stretch>
-            <a:fillRect/>
-          </a:stretch>
-        </p:blipFill>
-        <p:spPr bwMode="auto">
-          <a:xfrm>
-            <a:off x="862157" y="1359478"/>
-            <a:ext cx="10179916" cy="5089958"/>
-          </a:xfrm>
-          <a:prstGeom prst="rect">
-            <a:avLst/>
-          </a:prstGeom>
-          <a:noFill/>
-          <a:extLst>
-            <a:ext uri="{909E8E84-426E-40DD-AFC4-6F175D3DCCD1}">
-              <a14:hiddenFill xmlns:a14="http://schemas.microsoft.com/office/drawing/2010/main">
-                <a:solidFill>
-                  <a:srgbClr val="FFFFFF"/>
-                </a:solidFill>
-              </a14:hiddenFill>
-            </a:ext>
-          </a:extLst>
-        </p:spPr>
-      </p:pic>
-    </p:spTree>
-    <p:extLst>
-      <p:ext uri="{BB962C8B-B14F-4D97-AF65-F5344CB8AC3E}">
-        <p14:creationId xmlns:p14="http://schemas.microsoft.com/office/powerpoint/2010/main" val="1021495229"/>
-      </p:ext>
-    </p:extLst>
-  </p:cSld>
-  <p:clrMapOvr>
-    <a:masterClrMapping/>
-  </p:clrMapOvr>
-</p:sld>
-</file>
-
-<file path=ppt/slides/slide9.xml><?xml version="1.0" encoding="utf-8"?>
-<p:sld xmlns:a="http://schemas.openxmlformats.org/drawingml/2006/main" xmlns:r="http://schemas.openxmlformats.org/officeDocument/2006/relationships" xmlns:p="http://schemas.openxmlformats.org/presentationml/2006/main">
-  <p:cSld>
-    <p:spTree>
-      <p:nvGrpSpPr>
-        <p:cNvPr id="1" name=""/>
-        <p:cNvGrpSpPr/>
-        <p:nvPr/>
-      </p:nvGrpSpPr>
-      <p:grpSpPr>
-        <a:xfrm>
-          <a:off x="0" y="0"/>
-          <a:ext cx="0" cy="0"/>
-          <a:chOff x="0" y="0"/>
-          <a:chExt cx="0" cy="0"/>
-        </a:xfrm>
-      </p:grpSpPr>
-      <p:sp>
-        <p:nvSpPr>
-          <p:cNvPr id="2" name="Заголовок 1"/>
-          <p:cNvSpPr>
-            <a:spLocks noGrp="1"/>
-          </p:cNvSpPr>
-          <p:nvPr>
-            <p:ph type="title"/>
-          </p:nvPr>
-        </p:nvSpPr>
-        <p:spPr>
-          <a:xfrm>
-            <a:off x="124691" y="180110"/>
-            <a:ext cx="11014364" cy="817418"/>
-          </a:xfrm>
-        </p:spPr>
-        <p:txBody>
-          <a:bodyPr/>
-          <a:lstStyle/>
-          <a:p>
-            <a:pPr marL="285750" indent="-285750"/>
-            <a:r>
-              <a:rPr lang="ru-RU" dirty="0" smtClean="0">
-                <a:solidFill>
-                  <a:schemeClr val="tx1"/>
-                </a:solidFill>
-                <a:latin typeface="Times New Roman" panose="02020603050405020304" pitchFamily="18" charset="0"/>
-                <a:cs typeface="Times New Roman" panose="02020603050405020304" pitchFamily="18" charset="0"/>
-              </a:rPr>
-              <a:t>ТЕХНИКО-ЭКОНОМИЧЕСКИЕ ПОКАЗАТЕЛИ</a:t>
-            </a:r>
-            <a:endParaRPr lang="ru-RU" dirty="0">
+              <a:t>Спасибо за просмотр!</a:t>
+            </a:r>
+            <a:endParaRPr lang="ru-RU" sz="6000" dirty="0">
               <a:solidFill>
                 <a:schemeClr val="tx1"/>
               </a:solidFill>
@@ -8890,53 +8580,10 @@
           </a:p>
         </p:txBody>
       </p:sp>
-      <p:pic>
-        <p:nvPicPr>
-          <p:cNvPr id="4" name="Picture 2" descr="Крадущаяся экономика, затаившиеся инвестиции"/>
-          <p:cNvPicPr>
-            <a:picLocks noGrp="1" noChangeAspect="1" noChangeArrowheads="1"/>
-          </p:cNvPicPr>
-          <p:nvPr>
-            <p:ph idx="1"/>
-          </p:nvPr>
-        </p:nvPicPr>
-        <p:blipFill>
-          <a:blip r:embed="rId2">
-            <a:extLst>
-              <a:ext uri="{28A0092B-C50C-407E-A947-70E740481C1C}">
-                <a14:useLocalDpi xmlns:a14="http://schemas.microsoft.com/office/drawing/2010/main" val="0"/>
-              </a:ext>
-            </a:extLst>
-          </a:blip>
-          <a:srcRect/>
-          <a:stretch>
-            <a:fillRect/>
-          </a:stretch>
-        </p:blipFill>
-        <p:spPr bwMode="auto">
-          <a:xfrm>
-            <a:off x="1304144" y="997528"/>
-            <a:ext cx="8655458" cy="5564224"/>
-          </a:xfrm>
-          <a:prstGeom prst="rect">
-            <a:avLst/>
-          </a:prstGeom>
-          <a:noFill/>
-          <a:extLst>
-            <a:ext uri="{909E8E84-426E-40DD-AFC4-6F175D3DCCD1}">
-              <a14:hiddenFill xmlns:a14="http://schemas.microsoft.com/office/drawing/2010/main">
-                <a:solidFill>
-                  <a:srgbClr val="FFFFFF"/>
-                </a:solidFill>
-              </a14:hiddenFill>
-            </a:ext>
-          </a:extLst>
-        </p:spPr>
-      </p:pic>
     </p:spTree>
     <p:extLst>
       <p:ext uri="{BB962C8B-B14F-4D97-AF65-F5344CB8AC3E}">
-        <p14:creationId xmlns:p14="http://schemas.microsoft.com/office/powerpoint/2010/main" val="907799190"/>
+        <p14:creationId xmlns:p14="http://schemas.microsoft.com/office/powerpoint/2010/main" val="3035190050"/>
       </p:ext>
     </p:extLst>
   </p:cSld>

</xml_diff>